<commit_message>
Presentatie maar nu met GUI afbeelding
</commit_message>
<xml_diff>
--- a/Presentatie-Proftaak-AGV.pptx
+++ b/Presentatie-Proftaak-AGV.pptx
@@ -112,6 +112,11 @@
       </a:defRPr>
     </a:lvl9pPr>
   </p:defaultTextStyle>
+  <p:extLst>
+    <p:ext uri="{EFAFB233-063F-42B5-8137-9DF3F51BA10A}">
+      <p15:sldGuideLst xmlns:p15="http://schemas.microsoft.com/office/powerpoint/2012/main"/>
+    </p:ext>
+  </p:extLst>
 </p:presentation>
 </file>
 
@@ -6562,53 +6567,36 @@
           <a:chExt cx="0" cy="0"/>
         </a:xfrm>
       </p:grpSpPr>
-      <p:sp>
-        <p:nvSpPr>
-          <p:cNvPr id="4" name="Titel 1">
+      <p:pic>
+        <p:nvPicPr>
+          <p:cNvPr id="2" name="Afbeelding 1">
             <a:extLst>
               <a:ext uri="{FF2B5EF4-FFF2-40B4-BE49-F238E27FC236}">
-                <a16:creationId xmlns:a16="http://schemas.microsoft.com/office/drawing/2014/main" id="{AC0B768F-FA5A-468D-97DB-CD7AF8E973D4}"/>
+                <a16:creationId xmlns:a16="http://schemas.microsoft.com/office/drawing/2014/main" id="{07F79A20-A5E2-42A6-A802-B9C4314412C5}"/>
               </a:ext>
             </a:extLst>
           </p:cNvPr>
-          <p:cNvSpPr>
-            <a:spLocks noGrp="1"/>
-          </p:cNvSpPr>
-          <p:nvPr>
-            <p:ph type="title"/>
-          </p:nvPr>
-        </p:nvSpPr>
+          <p:cNvPicPr>
+            <a:picLocks noChangeAspect="1"/>
+          </p:cNvPicPr>
+          <p:nvPr/>
+        </p:nvPicPr>
+        <p:blipFill>
+          <a:blip r:embed="rId2"/>
+          <a:stretch>
+            <a:fillRect/>
+          </a:stretch>
+        </p:blipFill>
         <p:spPr>
           <a:xfrm>
-            <a:off x="3970685" y="2728735"/>
-            <a:ext cx="4250629" cy="1400530"/>
-          </a:xfrm>
-        </p:spPr>
-        <p:txBody>
-          <a:bodyPr/>
-          <a:lstStyle/>
-          <a:p>
-            <a:pPr algn="ctr"/>
-            <a:r>
-              <a:rPr lang="en-US" dirty="0" err="1"/>
-              <a:t>Foto</a:t>
-            </a:r>
-            <a:r>
-              <a:rPr lang="en-US" dirty="0"/>
-              <a:t> </a:t>
-            </a:r>
-            <a:r>
-              <a:rPr lang="en-US" dirty="0" err="1"/>
-              <a:t>gui</a:t>
-            </a:r>
-            <a:r>
-              <a:rPr lang="en-US" dirty="0"/>
-              <a:t>?</a:t>
-            </a:r>
-            <a:endParaRPr lang="nl-NL" dirty="0"/>
-          </a:p>
-        </p:txBody>
-      </p:sp>
+            <a:off x="2614612" y="966787"/>
+            <a:ext cx="6962775" cy="4924425"/>
+          </a:xfrm>
+          <a:prstGeom prst="rect">
+            <a:avLst/>
+          </a:prstGeom>
+        </p:spPr>
+      </p:pic>
     </p:spTree>
     <p:extLst>
       <p:ext uri="{BB962C8B-B14F-4D97-AF65-F5344CB8AC3E}">

</xml_diff>